<commit_message>
Minor changes to SCMP, SQAP, and SPMP slides
</commit_message>
<xml_diff>
--- a/Quan/Presentations/Phase I.pptx
+++ b/Quan/Presentations/Phase I.pptx
@@ -13808,7 +13808,7 @@
     </p:spTree>
     <p:extLst>
       <p:ext uri="{BB962C8B-B14F-4D97-AF65-F5344CB8AC3E}">
-        <p14:creationId xmlns:p14="http://schemas.microsoft.com/office/powerpoint/2010/main" val="1809248185"/>
+        <p14:creationId xmlns:p14="http://schemas.microsoft.com/office/powerpoint/2010/main" xmlns="" val="1809248185"/>
       </p:ext>
     </p:extLst>
   </p:cSld>
@@ -13870,7 +13870,9 @@
         </p:nvSpPr>
         <p:spPr/>
         <p:txBody>
-          <a:bodyPr/>
+          <a:bodyPr>
+            <a:normAutofit fontScale="92500"/>
+          </a:bodyPr>
           <a:lstStyle/>
           <a:p>
             <a:r>
@@ -13900,7 +13902,7 @@
           <a:p>
             <a:r>
               <a:rPr lang="en-US" dirty="0" smtClean="0"/>
-              <a:t>All </a:t>
+              <a:t>The Team Leader is responsible for maintaining and updating this documents.  All </a:t>
             </a:r>
             <a:r>
               <a:rPr lang="en-US" dirty="0" err="1" smtClean="0"/>
@@ -13917,7 +13919,7 @@
     </p:spTree>
     <p:extLst>
       <p:ext uri="{BB962C8B-B14F-4D97-AF65-F5344CB8AC3E}">
-        <p14:creationId xmlns:p14="http://schemas.microsoft.com/office/powerpoint/2010/main" val="1124672074"/>
+        <p14:creationId xmlns:p14="http://schemas.microsoft.com/office/powerpoint/2010/main" xmlns="" val="1124672074"/>
       </p:ext>
     </p:extLst>
   </p:cSld>
@@ -14044,7 +14046,7 @@
     </p:spTree>
     <p:extLst>
       <p:ext uri="{BB962C8B-B14F-4D97-AF65-F5344CB8AC3E}">
-        <p14:creationId xmlns:p14="http://schemas.microsoft.com/office/powerpoint/2010/main" val="1546467628"/>
+        <p14:creationId xmlns:p14="http://schemas.microsoft.com/office/powerpoint/2010/main" xmlns="" val="1546467628"/>
       </p:ext>
     </p:extLst>
   </p:cSld>

</xml_diff>